<commit_message>
@carlyledavis:  Corrected some rotation issues.
</commit_message>
<xml_diff>
--- a/services/studio/src/test/resources/initialize/CIN-32.pptx
+++ b/services/studio/src/test/resources/initialize/CIN-32.pptx
@@ -270,7 +270,7 @@
               <a:pPr>
                 <a:defRPr/>
               </a:pPr>
-              <a:t>1/21/19</a:t>
+              <a:t>1/25/19</a:t>
             </a:fld>
             <a:endParaRPr lang="en-US"/>
           </a:p>
@@ -650,7 +650,7 @@
               </a14:hiddenFill>
             </a:ext>
             <a:ext uri="{FAA26D3D-D897-4be2-8F04-BA451C77F1D7}">
-              <ma14:placeholderFlag xmlns:ma14="http://schemas.microsoft.com/office/mac/drawingml/2011/main" xmlns="" val="1"/>
+              <ma14:placeholderFlag xmlns="" xmlns:ma14="http://schemas.microsoft.com/office/mac/drawingml/2011/main" val="1"/>
             </a:ext>
           </a:extLst>
         </p:spPr>
@@ -686,7 +686,7 @@
               </a14:hiddenLine>
             </a:ext>
             <a:ext uri="{FAA26D3D-D897-4be2-8F04-BA451C77F1D7}">
-              <ma14:placeholderFlag xmlns:ma14="http://schemas.microsoft.com/office/mac/drawingml/2011/main" xmlns="" val="1"/>
+              <ma14:placeholderFlag xmlns="" xmlns:ma14="http://schemas.microsoft.com/office/mac/drawingml/2011/main" val="1"/>
             </a:ext>
           </a:extLst>
         </p:spPr>
@@ -967,7 +967,7 @@
               <a:pPr>
                 <a:defRPr/>
               </a:pPr>
-              <a:t>1/21/19</a:t>
+              <a:t>1/25/19</a:t>
             </a:fld>
             <a:endParaRPr lang="en-US" dirty="0"/>
           </a:p>
@@ -1180,7 +1180,7 @@
               <a:pPr>
                 <a:defRPr/>
               </a:pPr>
-              <a:t>1/21/19</a:t>
+              <a:t>1/25/19</a:t>
             </a:fld>
             <a:endParaRPr lang="en-US" dirty="0"/>
           </a:p>
@@ -1403,7 +1403,7 @@
               <a:pPr>
                 <a:defRPr/>
               </a:pPr>
-              <a:t>1/21/19</a:t>
+              <a:t>1/25/19</a:t>
             </a:fld>
             <a:endParaRPr lang="en-US" dirty="0"/>
           </a:p>
@@ -1616,7 +1616,7 @@
               <a:pPr>
                 <a:defRPr/>
               </a:pPr>
-              <a:t>1/21/19</a:t>
+              <a:t>1/25/19</a:t>
             </a:fld>
             <a:endParaRPr lang="en-US" dirty="0"/>
           </a:p>
@@ -1906,7 +1906,7 @@
               <a:pPr>
                 <a:defRPr/>
               </a:pPr>
-              <a:t>1/21/19</a:t>
+              <a:t>1/25/19</a:t>
             </a:fld>
             <a:endParaRPr lang="en-US" dirty="0"/>
           </a:p>
@@ -2236,7 +2236,7 @@
               <a:pPr>
                 <a:defRPr/>
               </a:pPr>
-              <a:t>1/21/19</a:t>
+              <a:t>1/25/19</a:t>
             </a:fld>
             <a:endParaRPr lang="en-US" dirty="0"/>
           </a:p>
@@ -2705,7 +2705,7 @@
               <a:pPr>
                 <a:defRPr/>
               </a:pPr>
-              <a:t>1/21/19</a:t>
+              <a:t>1/25/19</a:t>
             </a:fld>
             <a:endParaRPr lang="en-US" dirty="0"/>
           </a:p>
@@ -2867,7 +2867,7 @@
               <a:pPr>
                 <a:defRPr/>
               </a:pPr>
-              <a:t>1/21/19</a:t>
+              <a:t>1/25/19</a:t>
             </a:fld>
             <a:endParaRPr lang="en-US" dirty="0"/>
           </a:p>
@@ -3007,7 +3007,7 @@
               <a:pPr>
                 <a:defRPr/>
               </a:pPr>
-              <a:t>1/21/19</a:t>
+              <a:t>1/25/19</a:t>
             </a:fld>
             <a:endParaRPr lang="en-US" dirty="0"/>
           </a:p>
@@ -3327,7 +3327,7 @@
               <a:pPr>
                 <a:defRPr/>
               </a:pPr>
-              <a:t>1/21/19</a:t>
+              <a:t>1/25/19</a:t>
             </a:fld>
             <a:endParaRPr lang="en-US" dirty="0"/>
           </a:p>
@@ -3627,7 +3627,7 @@
               <a:pPr>
                 <a:defRPr/>
               </a:pPr>
-              <a:t>1/21/19</a:t>
+              <a:t>1/25/19</a:t>
             </a:fld>
             <a:endParaRPr lang="en-US" dirty="0"/>
           </a:p>
@@ -3783,7 +3783,7 @@
               </a14:hiddenLine>
             </a:ext>
             <a:ext uri="{FAA26D3D-D897-4be2-8F04-BA451C77F1D7}">
-              <ma14:placeholderFlag xmlns:ma14="http://schemas.microsoft.com/office/mac/drawingml/2011/main" xmlns="" val="1"/>
+              <ma14:placeholderFlag xmlns="" xmlns:ma14="http://schemas.microsoft.com/office/mac/drawingml/2011/main" val="1"/>
             </a:ext>
           </a:extLst>
         </p:spPr>
@@ -3844,7 +3844,7 @@
               </a14:hiddenLine>
             </a:ext>
             <a:ext uri="{FAA26D3D-D897-4be2-8F04-BA451C77F1D7}">
-              <ma14:placeholderFlag xmlns:ma14="http://schemas.microsoft.com/office/mac/drawingml/2011/main" xmlns="" val="1"/>
+              <ma14:placeholderFlag xmlns="" xmlns:ma14="http://schemas.microsoft.com/office/mac/drawingml/2011/main" val="1"/>
             </a:ext>
           </a:extLst>
         </p:spPr>
@@ -3948,7 +3948,7 @@
               <a:pPr>
                 <a:defRPr/>
               </a:pPr>
-              <a:t>1/21/19</a:t>
+              <a:t>1/25/19</a:t>
             </a:fld>
             <a:endParaRPr lang="en-US" dirty="0"/>
           </a:p>

</xml_diff>